<commit_message>
Minor change to sprint retrospective
Pdf updated accordingly
</commit_message>
<xml_diff>
--- a/Presentazione_SW2.pptx
+++ b/Presentazione_SW2.pptx
@@ -127,15 +127,15 @@
             <p14:sldId id="256"/>
             <p14:sldId id="258"/>
             <p14:sldId id="257"/>
+            <p14:sldId id="266"/>
+            <p14:sldId id="273"/>
             <p14:sldId id="259"/>
             <p14:sldId id="260"/>
             <p14:sldId id="261"/>
             <p14:sldId id="262"/>
             <p14:sldId id="263"/>
+            <p14:sldId id="267"/>
             <p14:sldId id="265"/>
-            <p14:sldId id="267"/>
-            <p14:sldId id="266"/>
-            <p14:sldId id="273"/>
           </p14:sldIdLst>
         </p14:section>
       </p14:sectionLst>
@@ -9435,7 +9435,7 @@
         </p:nvGraphicFramePr>
         <p:xfrm>
           <a:off x="5825556" y="2426568"/>
-          <a:ext cx="6023610" cy="4458970"/>
+          <a:ext cx="6023862" cy="4458970"/>
         </p:xfrm>
         <a:graphic>
           <a:graphicData uri="http://schemas.openxmlformats.org/drawingml/2006/table">
@@ -10030,8 +10030,8 @@
           <p:nvPr/>
         </p:nvGraphicFramePr>
         <p:xfrm>
-          <a:off x="5815396" y="1750928"/>
-          <a:ext cx="6023862" cy="4459219"/>
+          <a:off x="5815396" y="1242928"/>
+          <a:ext cx="6023610" cy="5388610"/>
         </p:xfrm>
         <a:graphic>
           <a:graphicData uri="http://schemas.openxmlformats.org/drawingml/2006/table">
@@ -10044,7 +10044,7 @@
                 <a:gridCol w="4803839"/>
                 <a:gridCol w="1220023"/>
               </a:tblGrid>
-              <a:tr h="1015733">
+              <a:tr h="1016000">
                 <a:tc>
                   <a:txBody>
                     <a:bodyPr/>
@@ -10340,11 +10340,26 @@
                         <a:spcBef>
                           <a:spcPts val="0"/>
                         </a:spcBef>
+                        <a:spcAft>
+                          <a:spcPts val="0"/>
+                        </a:spcAft>
                         <a:buClrTx/>
                         <a:buSzTx/>
                         <a:buFontTx/>
                         <a:buNone/>
                       </a:pPr>
+                      <a:r>
+                        <a:rPr lang="it-IT" sz="2300" noProof="0" err="1">
+                          <a:solidFill>
+                            <a:schemeClr val="tx1">
+                              <a:lumMod val="75000"/>
+                              <a:lumOff val="25000"/>
+                            </a:schemeClr>
+                          </a:solidFill>
+                          <a:sym typeface="+mn-ea"/>
+                        </a:rPr>
+                        <a:t>Total task </a:t>
+                      </a:r>
                       <a:r>
                         <a:rPr lang="it-IT" sz="2300" dirty="0">
                           <a:solidFill>
@@ -10355,43 +10370,21 @@
                           </a:solidFill>
                           <a:sym typeface="+mn-ea"/>
                         </a:rPr>
-                        <a:t>Actual hours per task: average</a:t>
+                        <a:t>estimation </a:t>
                       </a:r>
-                      <a:endParaRPr lang="it-IT" sz="2300" dirty="0">
-                        <a:solidFill>
-                          <a:schemeClr val="tx1">
-                            <a:lumMod val="75000"/>
-                            <a:lumOff val="25000"/>
-                          </a:schemeClr>
-                        </a:solidFill>
-                        <a:sym typeface="+mn-ea"/>
-                      </a:endParaRPr>
-                    </a:p>
-                    <a:p>
-                      <a:pPr lvl="0" algn="l">
-                        <a:lnSpc>
-                          <a:spcPct val="100000"/>
-                        </a:lnSpc>
-                        <a:spcBef>
-                          <a:spcPts val="0"/>
-                        </a:spcBef>
-                        <a:buClrTx/>
-                        <a:buSzTx/>
-                        <a:buFontTx/>
-                        <a:buNone/>
-                      </a:pPr>
                       <a:r>
-                        <a:rPr lang="it-IT" sz="2300" b="0" i="0" u="none" strike="noStrike" dirty="0">
+                        <a:rPr lang="it-IT" sz="2300" noProof="0" err="1">
                           <a:solidFill>
                             <a:schemeClr val="tx1">
                               <a:lumMod val="75000"/>
                               <a:lumOff val="25000"/>
                             </a:schemeClr>
                           </a:solidFill>
+                          <a:sym typeface="+mn-ea"/>
                         </a:rPr>
-                        <a:t>Actual hours per task: standard deviation</a:t>
+                        <a:t>error</a:t>
                       </a:r>
-                      <a:endParaRPr lang="it-IT" sz="2300" b="0" i="0" u="none" strike="noStrike" dirty="0">
+                      <a:endParaRPr lang="it-IT" sz="2300" b="0" i="0" u="none" strike="noStrike" noProof="0" err="1">
                         <a:solidFill>
                           <a:schemeClr val="tx1">
                             <a:lumMod val="75000"/>
@@ -10427,6 +10420,230 @@
                       <a:prstDash val="solid"/>
                     </a:lnB>
                     <a:noFill/>
+                  </a:tcPr>
+                </a:tc>
+                <a:tc>
+                  <a:txBody>
+                    <a:bodyPr/>
+                    <a:p>
+                      <a:pPr algn="l">
+                        <a:spcBef>
+                          <a:spcPts val="0"/>
+                        </a:spcBef>
+                        <a:spcAft>
+                          <a:spcPts val="0"/>
+                        </a:spcAft>
+                        <a:buClrTx/>
+                        <a:buSzTx/>
+                        <a:buFontTx/>
+                        <a:buNone/>
+                      </a:pPr>
+                      <a:r>
+                        <a:rPr lang="it-IT" sz="2300" noProof="0" err="1">
+                          <a:solidFill>
+                            <a:schemeClr val="tx1">
+                              <a:lumMod val="75000"/>
+                              <a:lumOff val="25000"/>
+                            </a:schemeClr>
+                          </a:solidFill>
+                          <a:sym typeface="+mn-ea"/>
+                        </a:rPr>
+                        <a:t>1,3</a:t>
+                      </a:r>
+                      <a:endParaRPr lang="it-IT" sz="2300" b="0" i="0" u="none" strike="noStrike" noProof="0" err="1">
+                        <a:solidFill>
+                          <a:schemeClr val="tx1">
+                            <a:lumMod val="75000"/>
+                            <a:lumOff val="25000"/>
+                          </a:schemeClr>
+                        </a:solidFill>
+                      </a:endParaRPr>
+                    </a:p>
+                    <a:p>
+                      <a:pPr algn="l">
+                        <a:spcBef>
+                          <a:spcPts val="0"/>
+                        </a:spcBef>
+                        <a:spcAft>
+                          <a:spcPts val="0"/>
+                        </a:spcAft>
+                        <a:buClrTx/>
+                        <a:buSzTx/>
+                        <a:buFontTx/>
+                        <a:buNone/>
+                      </a:pPr>
+                      <a:endParaRPr lang="it-IT" sz="2300" b="0" i="0" u="none" strike="noStrike" noProof="0" err="1">
+                        <a:solidFill>
+                          <a:schemeClr val="tx1">
+                            <a:lumMod val="75000"/>
+                            <a:lumOff val="25000"/>
+                          </a:schemeClr>
+                        </a:solidFill>
+                      </a:endParaRPr>
+                    </a:p>
+                  </a:txBody>
+                  <a:tcPr marL="274522" marR="251646" marT="137261" marB="137261">
+                    <a:lnL w="9525" cap="flat" cmpd="sng" algn="ctr">
+                      <a:solidFill>
+                        <a:srgbClr val="D8DCDC"/>
+                      </a:solidFill>
+                      <a:prstDash val="solid"/>
+                    </a:lnL>
+                    <a:lnR w="9525" cap="flat" cmpd="sng" algn="ctr">
+                      <a:solidFill>
+                        <a:srgbClr val="D8DCDC"/>
+                      </a:solidFill>
+                      <a:prstDash val="solid"/>
+                    </a:lnR>
+                    <a:lnT w="9525" cap="flat" cmpd="sng" algn="ctr">
+                      <a:solidFill>
+                        <a:srgbClr val="D8DCDC"/>
+                      </a:solidFill>
+                      <a:prstDash val="solid"/>
+                    </a:lnT>
+                    <a:lnB w="9525" cap="flat" cmpd="sng" algn="ctr">
+                      <a:solidFill>
+                        <a:srgbClr val="D8DCDC"/>
+                      </a:solidFill>
+                      <a:prstDash val="solid"/>
+                    </a:lnB>
+                    <a:noFill/>
+                  </a:tcPr>
+                </a:tc>
+              </a:tr>
+              <a:tr h="1015733">
+                <a:tc>
+                  <a:txBody>
+                    <a:bodyPr/>
+                    <a:p>
+                      <a:pPr lvl="0" algn="l">
+                        <a:lnSpc>
+                          <a:spcPct val="100000"/>
+                        </a:lnSpc>
+                        <a:spcBef>
+                          <a:spcPts val="0"/>
+                        </a:spcBef>
+                        <a:spcAft>
+                          <a:spcPts val="0"/>
+                        </a:spcAft>
+                        <a:buClrTx/>
+                        <a:buSzTx/>
+                        <a:buFontTx/>
+                        <a:buNone/>
+                      </a:pPr>
+                      <a:r>
+                        <a:rPr lang="it-IT" sz="2300" noProof="0" err="1">
+                          <a:solidFill>
+                            <a:schemeClr val="tx1">
+                              <a:lumMod val="75000"/>
+                              <a:lumOff val="25000"/>
+                            </a:schemeClr>
+                          </a:solidFill>
+                          <a:sym typeface="+mn-ea"/>
+                        </a:rPr>
+                        <a:t>Actual </a:t>
+                      </a:r>
+                      <a:r>
+                        <a:rPr lang="it-IT" sz="2300" dirty="0">
+                          <a:solidFill>
+                            <a:schemeClr val="tx1">
+                              <a:lumMod val="75000"/>
+                              <a:lumOff val="25000"/>
+                            </a:schemeClr>
+                          </a:solidFill>
+                          <a:sym typeface="+mn-ea"/>
+                        </a:rPr>
+                        <a:t>hours </a:t>
+                      </a:r>
+                      <a:r>
+                        <a:rPr lang="it-IT" sz="2300" noProof="0" err="1">
+                          <a:solidFill>
+                            <a:schemeClr val="tx1">
+                              <a:lumMod val="75000"/>
+                              <a:lumOff val="25000"/>
+                            </a:schemeClr>
+                          </a:solidFill>
+                          <a:sym typeface="+mn-ea"/>
+                        </a:rPr>
+                        <a:t>per task: average</a:t>
+                      </a:r>
+                      <a:endParaRPr lang="it-IT" sz="2300" noProof="0" err="1">
+                        <a:solidFill>
+                          <a:schemeClr val="tx1">
+                            <a:lumMod val="75000"/>
+                            <a:lumOff val="25000"/>
+                          </a:schemeClr>
+                        </a:solidFill>
+                        <a:sym typeface="+mn-ea"/>
+                      </a:endParaRPr>
+                    </a:p>
+                    <a:p>
+                      <a:pPr lvl="0" algn="l">
+                        <a:lnSpc>
+                          <a:spcPct val="100000"/>
+                        </a:lnSpc>
+                        <a:spcBef>
+                          <a:spcPts val="0"/>
+                        </a:spcBef>
+                        <a:spcAft>
+                          <a:spcPts val="0"/>
+                        </a:spcAft>
+                        <a:buClrTx/>
+                        <a:buSzTx/>
+                        <a:buFontTx/>
+                        <a:buNone/>
+                      </a:pPr>
+                      <a:r>
+                        <a:rPr lang="it-IT" sz="2300" b="0" i="0" u="none" strike="noStrike" noProof="0" err="1">
+                          <a:solidFill>
+                            <a:schemeClr val="tx1">
+                              <a:lumMod val="75000"/>
+                              <a:lumOff val="25000"/>
+                            </a:schemeClr>
+                          </a:solidFill>
+                        </a:rPr>
+                        <a:t>Actual hours per task: standard deviation</a:t>
+                      </a:r>
+                      <a:endParaRPr lang="it-IT" sz="2300" b="0" i="0" u="none" strike="noStrike" noProof="0" err="1">
+                        <a:solidFill>
+                          <a:schemeClr val="tx1">
+                            <a:lumMod val="75000"/>
+                            <a:lumOff val="25000"/>
+                          </a:schemeClr>
+                        </a:solidFill>
+                      </a:endParaRPr>
+                    </a:p>
+                  </a:txBody>
+                  <a:tcPr marL="274522" marR="251646" marT="137261" marB="137261">
+                    <a:lnL w="9525" cap="flat" cmpd="sng" algn="ctr">
+                      <a:solidFill>
+                        <a:srgbClr val="D8DCDC"/>
+                      </a:solidFill>
+                      <a:prstDash val="solid"/>
+                    </a:lnL>
+                    <a:lnR w="9525" cap="flat" cmpd="sng" algn="ctr">
+                      <a:solidFill>
+                        <a:srgbClr val="D8DCDC"/>
+                      </a:solidFill>
+                      <a:prstDash val="solid"/>
+                    </a:lnR>
+                    <a:lnT w="9525" cap="flat" cmpd="sng" algn="ctr">
+                      <a:solidFill>
+                        <a:srgbClr val="D8DCDC"/>
+                      </a:solidFill>
+                      <a:prstDash val="solid"/>
+                    </a:lnT>
+                    <a:lnB w="9525" cap="flat" cmpd="sng" algn="ctr">
+                      <a:solidFill>
+                        <a:srgbClr val="D8DCDC"/>
+                      </a:solidFill>
+                      <a:prstDash val="solid"/>
+                    </a:lnB>
+                    <a:solidFill>
+                      <a:srgbClr val="D8DEDC">
+                        <a:alpha val="20000"/>
+                      </a:srgbClr>
+                    </a:solidFill>
                   </a:tcPr>
                 </a:tc>
                 <a:tc>
@@ -10514,7 +10731,11 @@
                       </a:solidFill>
                       <a:prstDash val="solid"/>
                     </a:lnB>
-                    <a:noFill/>
+                    <a:solidFill>
+                      <a:srgbClr val="D8DEDC">
+                        <a:alpha val="20000"/>
+                      </a:srgbClr>
+                    </a:solidFill>
                   </a:tcPr>
                 </a:tc>
               </a:tr>
@@ -10601,57 +10822,6 @@
           <a:chExt cx="0" cy="0"/>
         </a:xfrm>
       </p:grpSpPr>
-      <p:sp>
-        <p:nvSpPr>
-          <p:cNvPr id="8" name="CasellaDiTesto 7"/>
-          <p:cNvSpPr txBox="1"/>
-          <p:nvPr/>
-        </p:nvSpPr>
-        <p:spPr>
-          <a:xfrm>
-            <a:off x="10335260" y="4071620"/>
-            <a:ext cx="1515110" cy="922020"/>
-          </a:xfrm>
-          <a:prstGeom prst="rect">
-            <a:avLst/>
-          </a:prstGeom>
-          <a:noFill/>
-        </p:spPr>
-        <p:txBody>
-          <a:bodyPr wrap="square" rtlCol="0">
-            <a:spAutoFit/>
-          </a:bodyPr>
-          <a:lstStyle/>
-          <a:p>
-            <a:pPr algn="ctr"/>
-            <a:r>
-              <a:rPr lang="it-IT" dirty="0"/>
-              <a:t>Total task </a:t>
-            </a:r>
-            <a:r>
-              <a:rPr lang="it-IT" dirty="0" err="1"/>
-              <a:t>estimation</a:t>
-            </a:r>
-            <a:r>
-              <a:rPr lang="it-IT" dirty="0"/>
-              <a:t> </a:t>
-            </a:r>
-            <a:r>
-              <a:rPr lang="it-IT" dirty="0" err="1"/>
-              <a:t>error</a:t>
-            </a:r>
-            <a:r>
-              <a:rPr lang="it-IT" dirty="0"/>
-              <a:t>: </a:t>
-            </a:r>
-            <a:r>
-              <a:rPr lang="it-IT" i="1" dirty="0"/>
-              <a:t>1,3</a:t>
-            </a:r>
-            <a:endParaRPr lang="it-IT" i="1" dirty="0"/>
-          </a:p>
-        </p:txBody>
-      </p:sp>
       <p:sp>
         <p:nvSpPr>
           <p:cNvPr id="2" name="Slide Number Placeholder 1"/>

</xml_diff>